<commit_message>
Kleine anpassung; nun 4 Fragen, mehr weiss ich grad echt nicht
</commit_message>
<xml_diff>
--- a/Recap.pptx
+++ b/Recap.pptx
@@ -13,6 +13,8 @@
     <p:sldId id="261" r:id="rId7"/>
     <p:sldId id="262" r:id="rId8"/>
     <p:sldId id="263" r:id="rId9"/>
+    <p:sldId id="264" r:id="rId10"/>
+    <p:sldId id="265" r:id="rId11"/>
   </p:sldIdLst>
   <p:sldSz cx="12192000" cy="6858000"/>
   <p:notesSz cx="6858000" cy="9144000"/>
@@ -250,7 +252,7 @@
           <a:p>
             <a:fld id="{7FB8BD76-8AE1-44E3-82B2-43BE0E35BCF0}" type="datetimeFigureOut">
               <a:rPr lang="de-CH" smtClean="0"/>
-              <a:t>06.10.2014</a:t>
+              <a:t>07.10.2014</a:t>
             </a:fld>
             <a:endParaRPr lang="de-CH"/>
           </a:p>
@@ -420,7 +422,7 @@
           <a:p>
             <a:fld id="{7FB8BD76-8AE1-44E3-82B2-43BE0E35BCF0}" type="datetimeFigureOut">
               <a:rPr lang="de-CH" smtClean="0"/>
-              <a:t>06.10.2014</a:t>
+              <a:t>07.10.2014</a:t>
             </a:fld>
             <a:endParaRPr lang="de-CH"/>
           </a:p>
@@ -600,7 +602,7 @@
           <a:p>
             <a:fld id="{7FB8BD76-8AE1-44E3-82B2-43BE0E35BCF0}" type="datetimeFigureOut">
               <a:rPr lang="de-CH" smtClean="0"/>
-              <a:t>06.10.2014</a:t>
+              <a:t>07.10.2014</a:t>
             </a:fld>
             <a:endParaRPr lang="de-CH"/>
           </a:p>
@@ -770,7 +772,7 @@
           <a:p>
             <a:fld id="{7FB8BD76-8AE1-44E3-82B2-43BE0E35BCF0}" type="datetimeFigureOut">
               <a:rPr lang="de-CH" smtClean="0"/>
-              <a:t>06.10.2014</a:t>
+              <a:t>07.10.2014</a:t>
             </a:fld>
             <a:endParaRPr lang="de-CH"/>
           </a:p>
@@ -1016,7 +1018,7 @@
           <a:p>
             <a:fld id="{7FB8BD76-8AE1-44E3-82B2-43BE0E35BCF0}" type="datetimeFigureOut">
               <a:rPr lang="de-CH" smtClean="0"/>
-              <a:t>06.10.2014</a:t>
+              <a:t>07.10.2014</a:t>
             </a:fld>
             <a:endParaRPr lang="de-CH"/>
           </a:p>
@@ -1248,7 +1250,7 @@
           <a:p>
             <a:fld id="{7FB8BD76-8AE1-44E3-82B2-43BE0E35BCF0}" type="datetimeFigureOut">
               <a:rPr lang="de-CH" smtClean="0"/>
-              <a:t>06.10.2014</a:t>
+              <a:t>07.10.2014</a:t>
             </a:fld>
             <a:endParaRPr lang="de-CH"/>
           </a:p>
@@ -1615,7 +1617,7 @@
           <a:p>
             <a:fld id="{7FB8BD76-8AE1-44E3-82B2-43BE0E35BCF0}" type="datetimeFigureOut">
               <a:rPr lang="de-CH" smtClean="0"/>
-              <a:t>06.10.2014</a:t>
+              <a:t>07.10.2014</a:t>
             </a:fld>
             <a:endParaRPr lang="de-CH"/>
           </a:p>
@@ -1733,7 +1735,7 @@
           <a:p>
             <a:fld id="{7FB8BD76-8AE1-44E3-82B2-43BE0E35BCF0}" type="datetimeFigureOut">
               <a:rPr lang="de-CH" smtClean="0"/>
-              <a:t>06.10.2014</a:t>
+              <a:t>07.10.2014</a:t>
             </a:fld>
             <a:endParaRPr lang="de-CH"/>
           </a:p>
@@ -1828,7 +1830,7 @@
           <a:p>
             <a:fld id="{7FB8BD76-8AE1-44E3-82B2-43BE0E35BCF0}" type="datetimeFigureOut">
               <a:rPr lang="de-CH" smtClean="0"/>
-              <a:t>06.10.2014</a:t>
+              <a:t>07.10.2014</a:t>
             </a:fld>
             <a:endParaRPr lang="de-CH"/>
           </a:p>
@@ -2105,7 +2107,7 @@
           <a:p>
             <a:fld id="{7FB8BD76-8AE1-44E3-82B2-43BE0E35BCF0}" type="datetimeFigureOut">
               <a:rPr lang="de-CH" smtClean="0"/>
-              <a:t>06.10.2014</a:t>
+              <a:t>07.10.2014</a:t>
             </a:fld>
             <a:endParaRPr lang="de-CH"/>
           </a:p>
@@ -2358,7 +2360,7 @@
           <a:p>
             <a:fld id="{7FB8BD76-8AE1-44E3-82B2-43BE0E35BCF0}" type="datetimeFigureOut">
               <a:rPr lang="de-CH" smtClean="0"/>
-              <a:t>06.10.2014</a:t>
+              <a:t>07.10.2014</a:t>
             </a:fld>
             <a:endParaRPr lang="de-CH"/>
           </a:p>
@@ -2571,7 +2573,7 @@
           <a:p>
             <a:fld id="{7FB8BD76-8AE1-44E3-82B2-43BE0E35BCF0}" type="datetimeFigureOut">
               <a:rPr lang="de-CH" smtClean="0"/>
-              <a:t>06.10.2014</a:t>
+              <a:t>07.10.2014</a:t>
             </a:fld>
             <a:endParaRPr lang="de-CH"/>
           </a:p>
@@ -3172,6 +3174,152 @@
   <p:clrMapOvr>
     <a:masterClrMapping/>
   </p:clrMapOvr>
+  <p:timing>
+    <p:tnLst>
+      <p:par>
+        <p:cTn id="1" dur="indefinite" restart="never" nodeType="tmRoot"/>
+      </p:par>
+    </p:tnLst>
+  </p:timing>
+</p:sld>
+</file>
+
+<file path=ppt/slides/slide10.xml><?xml version="1.0" encoding="utf-8"?>
+<p:sld xmlns:a="http://schemas.openxmlformats.org/drawingml/2006/main" xmlns:r="http://schemas.openxmlformats.org/officeDocument/2006/relationships" xmlns:p="http://schemas.openxmlformats.org/presentationml/2006/main">
+  <p:cSld>
+    <p:spTree>
+      <p:nvGrpSpPr>
+        <p:cNvPr id="1" name=""/>
+        <p:cNvGrpSpPr/>
+        <p:nvPr/>
+      </p:nvGrpSpPr>
+      <p:grpSpPr>
+        <a:xfrm>
+          <a:off x="0" y="0"/>
+          <a:ext cx="0" cy="0"/>
+          <a:chOff x="0" y="0"/>
+          <a:chExt cx="0" cy="0"/>
+        </a:xfrm>
+      </p:grpSpPr>
+      <p:pic>
+        <p:nvPicPr>
+          <p:cNvPr id="7" name="Grafik 6"/>
+          <p:cNvPicPr>
+            <a:picLocks noChangeAspect="1"/>
+          </p:cNvPicPr>
+          <p:nvPr/>
+        </p:nvPicPr>
+        <p:blipFill>
+          <a:blip r:embed="rId2"/>
+          <a:stretch>
+            <a:fillRect/>
+          </a:stretch>
+        </p:blipFill>
+        <p:spPr>
+          <a:xfrm>
+            <a:off x="671429" y="1015714"/>
+            <a:ext cx="4766203" cy="1009650"/>
+          </a:xfrm>
+          <a:prstGeom prst="rect">
+            <a:avLst/>
+          </a:prstGeom>
+        </p:spPr>
+      </p:pic>
+      <p:sp>
+        <p:nvSpPr>
+          <p:cNvPr id="2" name="Titel 1"/>
+          <p:cNvSpPr>
+            <a:spLocks noGrp="1"/>
+          </p:cNvSpPr>
+          <p:nvPr>
+            <p:ph type="title"/>
+          </p:nvPr>
+        </p:nvSpPr>
+        <p:spPr>
+          <a:xfrm>
+            <a:off x="826008" y="472964"/>
+            <a:ext cx="10515600" cy="1325563"/>
+          </a:xfrm>
+        </p:spPr>
+        <p:txBody>
+          <a:bodyPr>
+            <a:normAutofit/>
+          </a:bodyPr>
+          <a:lstStyle/>
+          <a:p>
+            <a:r>
+              <a:rPr lang="de-CH" dirty="0"/>
+              <a:t/>
+            </a:r>
+            <a:br>
+              <a:rPr lang="de-CH" dirty="0"/>
+            </a:br>
+            <a:r>
+              <a:rPr lang="de-CH" sz="4000" b="1" dirty="0" err="1" smtClean="0"/>
+              <a:t>Answers</a:t>
+            </a:r>
+            <a:endParaRPr lang="de-CH" dirty="0"/>
+          </a:p>
+        </p:txBody>
+      </p:sp>
+      <p:sp>
+        <p:nvSpPr>
+          <p:cNvPr id="3" name="Inhaltsplatzhalter 2"/>
+          <p:cNvSpPr>
+            <a:spLocks noGrp="1"/>
+          </p:cNvSpPr>
+          <p:nvPr>
+            <p:ph idx="1"/>
+          </p:nvPr>
+        </p:nvSpPr>
+        <p:spPr/>
+        <p:txBody>
+          <a:bodyPr/>
+          <a:lstStyle/>
+          <a:p>
+            <a:r>
+              <a:rPr lang="de-CH" dirty="0" smtClean="0"/>
+              <a:t>1</a:t>
+            </a:r>
+          </a:p>
+          <a:p>
+            <a:r>
+              <a:rPr lang="de-CH" dirty="0" smtClean="0"/>
+              <a:t>2</a:t>
+            </a:r>
+          </a:p>
+          <a:p>
+            <a:r>
+              <a:rPr lang="de-CH" dirty="0" smtClean="0"/>
+              <a:t>3</a:t>
+            </a:r>
+          </a:p>
+          <a:p>
+            <a:r>
+              <a:rPr lang="de-CH"/>
+              <a:t>4</a:t>
+            </a:r>
+            <a:endParaRPr lang="de-CH" dirty="0" smtClean="0"/>
+          </a:p>
+        </p:txBody>
+      </p:sp>
+    </p:spTree>
+    <p:extLst>
+      <p:ext uri="{BB962C8B-B14F-4D97-AF65-F5344CB8AC3E}">
+        <p14:creationId xmlns:p14="http://schemas.microsoft.com/office/powerpoint/2010/main" val="2921941853"/>
+      </p:ext>
+    </p:extLst>
+  </p:cSld>
+  <p:clrMapOvr>
+    <a:masterClrMapping/>
+  </p:clrMapOvr>
+  <p:timing>
+    <p:tnLst>
+      <p:par>
+        <p:cTn id="1" dur="indefinite" restart="never" nodeType="tmRoot"/>
+      </p:par>
+    </p:tnLst>
+  </p:timing>
 </p:sld>
 </file>
 
@@ -3284,38 +3432,86 @@
           <a:lstStyle/>
           <a:p>
             <a:r>
-              <a:rPr lang="de-CH" dirty="0" smtClean="0"/>
-              <a:t>Motivation</a:t>
-            </a:r>
+              <a:rPr lang="de-CH" dirty="0" err="1"/>
+              <a:t>m</a:t>
+            </a:r>
+            <a:r>
+              <a:rPr lang="de-CH" dirty="0" err="1" smtClean="0"/>
+              <a:t>otivation</a:t>
+            </a:r>
+            <a:endParaRPr lang="de-CH" dirty="0" smtClean="0"/>
           </a:p>
           <a:p>
             <a:pPr lvl="1"/>
             <a:r>
-              <a:rPr lang="de-CH" dirty="0" smtClean="0"/>
-              <a:t>bessere Lesbarkeit</a:t>
-            </a:r>
+              <a:rPr lang="en-US" dirty="0"/>
+              <a:t>e</a:t>
+            </a:r>
+            <a:r>
+              <a:rPr lang="en-US" dirty="0" smtClean="0"/>
+              <a:t>asier</a:t>
+            </a:r>
+            <a:r>
+              <a:rPr lang="de-CH" dirty="0" smtClean="0"/>
+              <a:t> </a:t>
+            </a:r>
+            <a:r>
+              <a:rPr lang="de-CH" dirty="0" err="1" smtClean="0"/>
+              <a:t>to</a:t>
+            </a:r>
+            <a:r>
+              <a:rPr lang="de-CH" dirty="0" smtClean="0"/>
+              <a:t> </a:t>
+            </a:r>
+            <a:r>
+              <a:rPr lang="de-CH" dirty="0" err="1" smtClean="0"/>
+              <a:t>read</a:t>
+            </a:r>
+            <a:endParaRPr lang="de-CH" dirty="0" smtClean="0"/>
           </a:p>
           <a:p>
             <a:pPr lvl="1"/>
             <a:r>
               <a:rPr lang="de-CH" dirty="0" err="1" smtClean="0"/>
-              <a:t>Wiedeverwendbarkeit</a:t>
+              <a:t>reuseable</a:t>
             </a:r>
             <a:endParaRPr lang="de-CH" dirty="0" smtClean="0"/>
           </a:p>
           <a:p>
             <a:pPr lvl="1"/>
             <a:r>
-              <a:rPr lang="de-CH" dirty="0" smtClean="0"/>
-              <a:t>einfacher verständlich</a:t>
-            </a:r>
+              <a:rPr lang="de-CH" dirty="0" err="1"/>
+              <a:t>e</a:t>
+            </a:r>
+            <a:r>
+              <a:rPr lang="de-CH" dirty="0" err="1" smtClean="0"/>
+              <a:t>asier</a:t>
+            </a:r>
+            <a:r>
+              <a:rPr lang="de-CH" dirty="0" smtClean="0"/>
+              <a:t> </a:t>
+            </a:r>
+            <a:r>
+              <a:rPr lang="de-CH" dirty="0" err="1" smtClean="0"/>
+              <a:t>to</a:t>
+            </a:r>
+            <a:r>
+              <a:rPr lang="de-CH" dirty="0" smtClean="0"/>
+              <a:t> </a:t>
+            </a:r>
+            <a:r>
+              <a:rPr lang="de-CH" dirty="0" err="1" smtClean="0"/>
+              <a:t>understand</a:t>
+            </a:r>
+            <a:endParaRPr lang="de-CH" dirty="0" smtClean="0"/>
           </a:p>
           <a:p>
             <a:pPr lvl="1"/>
             <a:r>
-              <a:rPr lang="de-CH" dirty="0" smtClean="0"/>
-              <a:t>separiert</a:t>
-            </a:r>
+              <a:rPr lang="en-GB" dirty="0" smtClean="0"/>
+              <a:t>separated</a:t>
+            </a:r>
+            <a:endParaRPr lang="en-GB" dirty="0" smtClean="0"/>
           </a:p>
         </p:txBody>
       </p:sp>
@@ -3329,6 +3525,13 @@
   <p:clrMapOvr>
     <a:masterClrMapping/>
   </p:clrMapOvr>
+  <p:timing>
+    <p:tnLst>
+      <p:par>
+        <p:cTn id="1" dur="indefinite" restart="never" nodeType="tmRoot"/>
+      </p:par>
+    </p:tnLst>
+  </p:timing>
 </p:sld>
 </file>
 
@@ -3539,6 +3742,13 @@
   <p:clrMapOvr>
     <a:masterClrMapping/>
   </p:clrMapOvr>
+  <p:timing>
+    <p:tnLst>
+      <p:par>
+        <p:cTn id="1" dur="indefinite" restart="never" nodeType="tmRoot"/>
+      </p:par>
+    </p:tnLst>
+  </p:timing>
 </p:sld>
 </file>
 
@@ -3696,6 +3906,13 @@
   <p:clrMapOvr>
     <a:masterClrMapping/>
   </p:clrMapOvr>
+  <p:timing>
+    <p:tnLst>
+      <p:par>
+        <p:cTn id="1" dur="indefinite" restart="never" nodeType="tmRoot"/>
+      </p:par>
+    </p:tnLst>
+  </p:timing>
 </p:sld>
 </file>
 
@@ -4810,6 +5027,13 @@
   <p:clrMapOvr>
     <a:masterClrMapping/>
   </p:clrMapOvr>
+  <p:timing>
+    <p:tnLst>
+      <p:par>
+        <p:cTn id="1" dur="indefinite" restart="never" nodeType="tmRoot"/>
+      </p:par>
+    </p:tnLst>
+  </p:timing>
 </p:sld>
 </file>
 
@@ -4906,6 +5130,13 @@
   <p:clrMapOvr>
     <a:masterClrMapping/>
   </p:clrMapOvr>
+  <p:timing>
+    <p:tnLst>
+      <p:par>
+        <p:cTn id="1" dur="indefinite" restart="never" nodeType="tmRoot"/>
+      </p:par>
+    </p:tnLst>
+  </p:timing>
 </p:sld>
 </file>
 
@@ -5073,6 +5304,13 @@
   <p:clrMapOvr>
     <a:masterClrMapping/>
   </p:clrMapOvr>
+  <p:timing>
+    <p:tnLst>
+      <p:par>
+        <p:cTn id="1" dur="indefinite" restart="never" nodeType="tmRoot"/>
+      </p:par>
+    </p:tnLst>
+  </p:timing>
 </p:sld>
 </file>
 
@@ -5170,18 +5408,317 @@
           <a:lstStyle/>
           <a:p>
             <a:r>
-              <a:rPr lang="de-CH" dirty="0" smtClean="0"/>
-              <a:t>Welche Art von Common Files ist geeignet wenn man alle Files an einem Ort halten möchte?</a:t>
-            </a:r>
+              <a:rPr lang="de-CH" dirty="0" err="1" smtClean="0"/>
+              <a:t>Which</a:t>
+            </a:r>
+            <a:r>
+              <a:rPr lang="de-CH" dirty="0" smtClean="0"/>
+              <a:t> type </a:t>
+            </a:r>
+            <a:r>
+              <a:rPr lang="de-CH" dirty="0" err="1" smtClean="0"/>
+              <a:t>of</a:t>
+            </a:r>
+            <a:r>
+              <a:rPr lang="de-CH" dirty="0" smtClean="0"/>
+              <a:t> </a:t>
+            </a:r>
+            <a:r>
+              <a:rPr lang="de-CH" dirty="0" err="1" smtClean="0"/>
+              <a:t>common</a:t>
+            </a:r>
+            <a:r>
+              <a:rPr lang="de-CH" dirty="0" smtClean="0"/>
+              <a:t> </a:t>
+            </a:r>
+            <a:r>
+              <a:rPr lang="de-CH" dirty="0" err="1" smtClean="0"/>
+              <a:t>files</a:t>
+            </a:r>
+            <a:r>
+              <a:rPr lang="de-CH" dirty="0" smtClean="0"/>
+              <a:t> </a:t>
+            </a:r>
+            <a:r>
+              <a:rPr lang="de-CH" dirty="0" err="1" smtClean="0"/>
+              <a:t>is</a:t>
+            </a:r>
+            <a:r>
+              <a:rPr lang="de-CH" dirty="0" smtClean="0"/>
+              <a:t> </a:t>
+            </a:r>
+            <a:r>
+              <a:rPr lang="de-CH" dirty="0" err="1" smtClean="0"/>
+              <a:t>used</a:t>
+            </a:r>
+            <a:r>
+              <a:rPr lang="de-CH" dirty="0" smtClean="0"/>
+              <a:t> </a:t>
+            </a:r>
+            <a:r>
+              <a:rPr lang="de-CH" dirty="0" err="1" smtClean="0"/>
+              <a:t>if</a:t>
+            </a:r>
+            <a:r>
+              <a:rPr lang="de-CH" dirty="0" smtClean="0"/>
+              <a:t> all </a:t>
+            </a:r>
+            <a:r>
+              <a:rPr lang="de-CH" dirty="0" err="1" smtClean="0"/>
+              <a:t>files</a:t>
+            </a:r>
+            <a:r>
+              <a:rPr lang="de-CH" dirty="0" smtClean="0"/>
+              <a:t> </a:t>
+            </a:r>
+            <a:r>
+              <a:rPr lang="de-CH" dirty="0" err="1" smtClean="0"/>
+              <a:t>should</a:t>
+            </a:r>
+            <a:r>
+              <a:rPr lang="de-CH" dirty="0" smtClean="0"/>
+              <a:t> </a:t>
+            </a:r>
+            <a:r>
+              <a:rPr lang="de-CH" dirty="0" err="1" smtClean="0"/>
+              <a:t>be</a:t>
+            </a:r>
+            <a:r>
+              <a:rPr lang="de-CH" dirty="0" smtClean="0"/>
+              <a:t> </a:t>
+            </a:r>
+            <a:r>
+              <a:rPr lang="de-CH" dirty="0" err="1" smtClean="0"/>
+              <a:t>stored</a:t>
+            </a:r>
+            <a:r>
+              <a:rPr lang="de-CH" dirty="0" smtClean="0"/>
+              <a:t> at </a:t>
+            </a:r>
+            <a:r>
+              <a:rPr lang="de-CH" dirty="0" err="1" smtClean="0"/>
+              <a:t>the</a:t>
+            </a:r>
+            <a:r>
+              <a:rPr lang="de-CH" dirty="0" smtClean="0"/>
+              <a:t> same </a:t>
+            </a:r>
+            <a:r>
+              <a:rPr lang="de-CH" dirty="0" err="1" smtClean="0"/>
+              <a:t>place</a:t>
+            </a:r>
+            <a:r>
+              <a:rPr lang="de-CH" dirty="0" smtClean="0"/>
+              <a:t>?</a:t>
+            </a:r>
+            <a:endParaRPr lang="de-CH" dirty="0" smtClean="0"/>
           </a:p>
           <a:p>
             <a:endParaRPr lang="de-CH" dirty="0"/>
           </a:p>
           <a:p>
             <a:r>
-              <a:rPr lang="de-CH" dirty="0" smtClean="0"/>
-              <a:t>Welche Art von Common Files birgt den Nachteil das Änderungen mehrfach gemacht werden müssen?</a:t>
-            </a:r>
+              <a:rPr lang="de-CH" dirty="0" err="1" smtClean="0"/>
+              <a:t>Which</a:t>
+            </a:r>
+            <a:r>
+              <a:rPr lang="de-CH" dirty="0" smtClean="0"/>
+              <a:t> type </a:t>
+            </a:r>
+            <a:r>
+              <a:rPr lang="de-CH" dirty="0" err="1" smtClean="0"/>
+              <a:t>of</a:t>
+            </a:r>
+            <a:r>
+              <a:rPr lang="de-CH" dirty="0" smtClean="0"/>
+              <a:t> </a:t>
+            </a:r>
+            <a:r>
+              <a:rPr lang="de-CH" dirty="0" err="1" smtClean="0"/>
+              <a:t>common</a:t>
+            </a:r>
+            <a:r>
+              <a:rPr lang="de-CH" dirty="0" smtClean="0"/>
+              <a:t> </a:t>
+            </a:r>
+            <a:r>
+              <a:rPr lang="de-CH" dirty="0" err="1" smtClean="0"/>
+              <a:t>files</a:t>
+            </a:r>
+            <a:r>
+              <a:rPr lang="de-CH" dirty="0" smtClean="0"/>
+              <a:t> </a:t>
+            </a:r>
+            <a:r>
+              <a:rPr lang="de-CH" dirty="0" err="1" smtClean="0"/>
+              <a:t>have</a:t>
+            </a:r>
+            <a:r>
+              <a:rPr lang="de-CH" dirty="0" smtClean="0"/>
+              <a:t> </a:t>
+            </a:r>
+            <a:r>
+              <a:rPr lang="de-CH" dirty="0" err="1" smtClean="0"/>
+              <a:t>the</a:t>
+            </a:r>
+            <a:r>
+              <a:rPr lang="de-CH" dirty="0" smtClean="0"/>
+              <a:t> </a:t>
+            </a:r>
+            <a:r>
+              <a:rPr lang="de-CH" dirty="0" err="1" smtClean="0"/>
+              <a:t>disadvantage</a:t>
+            </a:r>
+            <a:r>
+              <a:rPr lang="de-CH" dirty="0" smtClean="0"/>
+              <a:t> </a:t>
+            </a:r>
+            <a:r>
+              <a:rPr lang="de-CH" dirty="0" err="1" smtClean="0"/>
+              <a:t>that</a:t>
+            </a:r>
+            <a:r>
+              <a:rPr lang="de-CH" dirty="0" smtClean="0"/>
+              <a:t> </a:t>
+            </a:r>
+            <a:r>
+              <a:rPr lang="de-CH" dirty="0" err="1" smtClean="0"/>
+              <a:t>changes</a:t>
+            </a:r>
+            <a:r>
+              <a:rPr lang="de-CH" dirty="0" smtClean="0"/>
+              <a:t> </a:t>
+            </a:r>
+            <a:r>
+              <a:rPr lang="de-CH" dirty="0" err="1" smtClean="0"/>
+              <a:t>need</a:t>
+            </a:r>
+            <a:r>
+              <a:rPr lang="de-CH" dirty="0" smtClean="0"/>
+              <a:t> an </a:t>
+            </a:r>
+            <a:r>
+              <a:rPr lang="de-CH" dirty="0" err="1" smtClean="0"/>
+              <a:t>be</a:t>
+            </a:r>
+            <a:r>
+              <a:rPr lang="de-CH" dirty="0" smtClean="0"/>
+              <a:t> </a:t>
+            </a:r>
+            <a:r>
+              <a:rPr lang="de-CH" dirty="0" err="1" smtClean="0"/>
+              <a:t>done</a:t>
+            </a:r>
+            <a:r>
+              <a:rPr lang="de-CH" dirty="0" smtClean="0"/>
+              <a:t> </a:t>
+            </a:r>
+            <a:r>
+              <a:rPr lang="de-CH" dirty="0" smtClean="0"/>
+              <a:t>in </a:t>
+            </a:r>
+            <a:r>
+              <a:rPr lang="de-CH" dirty="0" err="1" smtClean="0"/>
+              <a:t>more</a:t>
+            </a:r>
+            <a:r>
+              <a:rPr lang="de-CH" dirty="0" smtClean="0"/>
+              <a:t> </a:t>
+            </a:r>
+            <a:r>
+              <a:rPr lang="de-CH" dirty="0" err="1" smtClean="0"/>
+              <a:t>than</a:t>
+            </a:r>
+            <a:r>
+              <a:rPr lang="de-CH" dirty="0" smtClean="0"/>
+              <a:t> </a:t>
+            </a:r>
+            <a:r>
+              <a:rPr lang="de-CH" dirty="0" err="1" smtClean="0"/>
+              <a:t>one</a:t>
+            </a:r>
+            <a:r>
+              <a:rPr lang="de-CH" dirty="0" smtClean="0"/>
+              <a:t> </a:t>
+            </a:r>
+            <a:r>
+              <a:rPr lang="de-CH" dirty="0" err="1" smtClean="0"/>
+              <a:t>file</a:t>
+            </a:r>
+            <a:r>
+              <a:rPr lang="de-CH" dirty="0" smtClean="0"/>
+              <a:t>?</a:t>
+            </a:r>
+          </a:p>
+          <a:p>
+            <a:endParaRPr lang="de-CH" dirty="0" smtClean="0"/>
+          </a:p>
+          <a:p>
+            <a:r>
+              <a:rPr lang="de-CH" dirty="0" err="1" smtClean="0"/>
+              <a:t>name</a:t>
+            </a:r>
+            <a:r>
+              <a:rPr lang="de-CH" dirty="0" smtClean="0"/>
+              <a:t> </a:t>
+            </a:r>
+            <a:r>
+              <a:rPr lang="de-CH" dirty="0" err="1" smtClean="0"/>
+              <a:t>three</a:t>
+            </a:r>
+            <a:r>
+              <a:rPr lang="de-CH" dirty="0" smtClean="0"/>
+              <a:t> </a:t>
+            </a:r>
+            <a:r>
+              <a:rPr lang="de-CH" dirty="0" err="1" smtClean="0"/>
+              <a:t>reasons</a:t>
+            </a:r>
+            <a:r>
+              <a:rPr lang="de-CH" dirty="0" smtClean="0"/>
+              <a:t> </a:t>
+            </a:r>
+            <a:r>
+              <a:rPr lang="de-CH" dirty="0" err="1" smtClean="0"/>
+              <a:t>why</a:t>
+            </a:r>
+            <a:r>
+              <a:rPr lang="de-CH" dirty="0" smtClean="0"/>
+              <a:t> </a:t>
+            </a:r>
+            <a:r>
+              <a:rPr lang="de-CH" dirty="0" err="1" smtClean="0"/>
+              <a:t>project</a:t>
+            </a:r>
+            <a:r>
+              <a:rPr lang="de-CH" dirty="0" smtClean="0"/>
+              <a:t> </a:t>
+            </a:r>
+            <a:r>
+              <a:rPr lang="de-CH" dirty="0" err="1" smtClean="0"/>
+              <a:t>stould</a:t>
+            </a:r>
+            <a:r>
+              <a:rPr lang="de-CH" dirty="0" smtClean="0"/>
+              <a:t> </a:t>
+            </a:r>
+            <a:r>
+              <a:rPr lang="de-CH" dirty="0" err="1" smtClean="0"/>
+              <a:t>be</a:t>
+            </a:r>
+            <a:r>
+              <a:rPr lang="de-CH" dirty="0" smtClean="0"/>
+              <a:t> </a:t>
+            </a:r>
+            <a:r>
+              <a:rPr lang="de-CH" dirty="0" err="1" smtClean="0"/>
+              <a:t>structured</a:t>
+            </a:r>
+            <a:r>
+              <a:rPr lang="de-CH" dirty="0" smtClean="0"/>
+              <a:t>?</a:t>
+            </a:r>
+            <a:endParaRPr lang="de-CH" dirty="0" smtClean="0"/>
           </a:p>
         </p:txBody>
       </p:sp>
@@ -5195,6 +5732,250 @@
   <p:clrMapOvr>
     <a:masterClrMapping/>
   </p:clrMapOvr>
+  <p:timing>
+    <p:tnLst>
+      <p:par>
+        <p:cTn id="1" dur="indefinite" restart="never" nodeType="tmRoot"/>
+      </p:par>
+    </p:tnLst>
+  </p:timing>
+</p:sld>
+</file>
+
+<file path=ppt/slides/slide9.xml><?xml version="1.0" encoding="utf-8"?>
+<p:sld xmlns:a="http://schemas.openxmlformats.org/drawingml/2006/main" xmlns:r="http://schemas.openxmlformats.org/officeDocument/2006/relationships" xmlns:p="http://schemas.openxmlformats.org/presentationml/2006/main">
+  <p:cSld>
+    <p:spTree>
+      <p:nvGrpSpPr>
+        <p:cNvPr id="1" name=""/>
+        <p:cNvGrpSpPr/>
+        <p:nvPr/>
+      </p:nvGrpSpPr>
+      <p:grpSpPr>
+        <a:xfrm>
+          <a:off x="0" y="0"/>
+          <a:ext cx="0" cy="0"/>
+          <a:chOff x="0" y="0"/>
+          <a:chExt cx="0" cy="0"/>
+        </a:xfrm>
+      </p:grpSpPr>
+      <p:pic>
+        <p:nvPicPr>
+          <p:cNvPr id="7" name="Grafik 6"/>
+          <p:cNvPicPr>
+            <a:picLocks noChangeAspect="1"/>
+          </p:cNvPicPr>
+          <p:nvPr/>
+        </p:nvPicPr>
+        <p:blipFill>
+          <a:blip r:embed="rId2"/>
+          <a:stretch>
+            <a:fillRect/>
+          </a:stretch>
+        </p:blipFill>
+        <p:spPr>
+          <a:xfrm>
+            <a:off x="671429" y="1015714"/>
+            <a:ext cx="4766203" cy="1009650"/>
+          </a:xfrm>
+          <a:prstGeom prst="rect">
+            <a:avLst/>
+          </a:prstGeom>
+        </p:spPr>
+      </p:pic>
+      <p:sp>
+        <p:nvSpPr>
+          <p:cNvPr id="2" name="Titel 1"/>
+          <p:cNvSpPr>
+            <a:spLocks noGrp="1"/>
+          </p:cNvSpPr>
+          <p:nvPr>
+            <p:ph type="title"/>
+          </p:nvPr>
+        </p:nvSpPr>
+        <p:spPr>
+          <a:xfrm>
+            <a:off x="826008" y="472964"/>
+            <a:ext cx="10515600" cy="1325563"/>
+          </a:xfrm>
+        </p:spPr>
+        <p:txBody>
+          <a:bodyPr>
+            <a:normAutofit/>
+          </a:bodyPr>
+          <a:lstStyle/>
+          <a:p>
+            <a:r>
+              <a:rPr lang="de-CH" dirty="0"/>
+              <a:t/>
+            </a:r>
+            <a:br>
+              <a:rPr lang="de-CH" dirty="0"/>
+            </a:br>
+            <a:r>
+              <a:rPr lang="de-CH" sz="4000" b="1" dirty="0" err="1" smtClean="0"/>
+              <a:t>Questions</a:t>
+            </a:r>
+            <a:endParaRPr lang="de-CH" dirty="0"/>
+          </a:p>
+        </p:txBody>
+      </p:sp>
+      <p:sp>
+        <p:nvSpPr>
+          <p:cNvPr id="3" name="Inhaltsplatzhalter 2"/>
+          <p:cNvSpPr>
+            <a:spLocks noGrp="1"/>
+          </p:cNvSpPr>
+          <p:nvPr>
+            <p:ph idx="1"/>
+          </p:nvPr>
+        </p:nvSpPr>
+        <p:spPr/>
+        <p:txBody>
+          <a:bodyPr/>
+          <a:lstStyle/>
+          <a:p>
+            <a:r>
+              <a:rPr lang="de-CH" dirty="0" err="1" smtClean="0"/>
+              <a:t>What</a:t>
+            </a:r>
+            <a:r>
+              <a:rPr lang="de-CH" dirty="0" smtClean="0"/>
+              <a:t> do </a:t>
+            </a:r>
+            <a:r>
+              <a:rPr lang="de-CH" dirty="0" err="1" smtClean="0"/>
+              <a:t>you</a:t>
+            </a:r>
+            <a:r>
+              <a:rPr lang="de-CH" dirty="0" smtClean="0"/>
+              <a:t> </a:t>
+            </a:r>
+            <a:r>
+              <a:rPr lang="de-CH" dirty="0" err="1" smtClean="0"/>
+              <a:t>need</a:t>
+            </a:r>
+            <a:r>
+              <a:rPr lang="de-CH" dirty="0" smtClean="0"/>
+              <a:t> </a:t>
+            </a:r>
+            <a:r>
+              <a:rPr lang="de-CH" dirty="0" err="1" smtClean="0"/>
+              <a:t>to</a:t>
+            </a:r>
+            <a:r>
+              <a:rPr lang="de-CH" dirty="0" smtClean="0"/>
+              <a:t> </a:t>
+            </a:r>
+            <a:r>
+              <a:rPr lang="de-CH" dirty="0" err="1" smtClean="0"/>
+              <a:t>add</a:t>
+            </a:r>
+            <a:r>
+              <a:rPr lang="de-CH" dirty="0" smtClean="0"/>
+              <a:t> in </a:t>
+            </a:r>
+            <a:r>
+              <a:rPr lang="de-CH" dirty="0" err="1" smtClean="0"/>
+              <a:t>the</a:t>
+            </a:r>
+            <a:r>
+              <a:rPr lang="de-CH" dirty="0" smtClean="0"/>
+              <a:t> relative </a:t>
+            </a:r>
+            <a:r>
+              <a:rPr lang="de-CH" dirty="0" err="1" smtClean="0"/>
+              <a:t>project</a:t>
+            </a:r>
+            <a:r>
+              <a:rPr lang="de-CH" dirty="0" smtClean="0"/>
+              <a:t> </a:t>
+            </a:r>
+            <a:r>
+              <a:rPr lang="de-CH" dirty="0" err="1" smtClean="0"/>
+              <a:t>location</a:t>
+            </a:r>
+            <a:r>
+              <a:rPr lang="de-CH" dirty="0" smtClean="0"/>
+              <a:t> </a:t>
+            </a:r>
+            <a:r>
+              <a:rPr lang="de-CH" dirty="0" err="1" smtClean="0"/>
+              <a:t>to</a:t>
+            </a:r>
+            <a:r>
+              <a:rPr lang="de-CH" dirty="0" smtClean="0"/>
+              <a:t> </a:t>
+            </a:r>
+            <a:r>
+              <a:rPr lang="de-CH" dirty="0" err="1" smtClean="0"/>
+              <a:t>move</a:t>
+            </a:r>
+            <a:r>
+              <a:rPr lang="de-CH" dirty="0" smtClean="0"/>
+              <a:t> </a:t>
+            </a:r>
+            <a:r>
+              <a:rPr lang="de-CH" dirty="0" err="1" smtClean="0"/>
+              <a:t>up</a:t>
+            </a:r>
+            <a:r>
+              <a:rPr lang="de-CH" dirty="0" smtClean="0"/>
+              <a:t> on </a:t>
+            </a:r>
+            <a:r>
+              <a:rPr lang="de-CH" dirty="0" err="1" smtClean="0"/>
+              <a:t>step</a:t>
+            </a:r>
+            <a:r>
+              <a:rPr lang="de-CH" dirty="0" smtClean="0"/>
+              <a:t> in </a:t>
+            </a:r>
+            <a:r>
+              <a:rPr lang="de-CH" dirty="0" err="1" smtClean="0"/>
+              <a:t>the</a:t>
+            </a:r>
+            <a:r>
+              <a:rPr lang="de-CH" dirty="0" smtClean="0"/>
+              <a:t> </a:t>
+            </a:r>
+            <a:r>
+              <a:rPr lang="de-CH" dirty="0" err="1" smtClean="0"/>
+              <a:t>folder</a:t>
+            </a:r>
+            <a:r>
+              <a:rPr lang="de-CH" dirty="0" smtClean="0"/>
+              <a:t> </a:t>
+            </a:r>
+            <a:r>
+              <a:rPr lang="de-CH" dirty="0" err="1" smtClean="0"/>
+              <a:t>directory</a:t>
+            </a:r>
+            <a:r>
+              <a:rPr lang="de-CH" dirty="0" smtClean="0"/>
+              <a:t>?</a:t>
+            </a:r>
+            <a:endParaRPr lang="de-CH" dirty="0" smtClean="0"/>
+          </a:p>
+        </p:txBody>
+      </p:sp>
+    </p:spTree>
+    <p:extLst>
+      <p:ext uri="{BB962C8B-B14F-4D97-AF65-F5344CB8AC3E}">
+        <p14:creationId xmlns:p14="http://schemas.microsoft.com/office/powerpoint/2010/main" val="920642799"/>
+      </p:ext>
+    </p:extLst>
+  </p:cSld>
+  <p:clrMapOvr>
+    <a:masterClrMapping/>
+  </p:clrMapOvr>
+  <p:timing>
+    <p:tnLst>
+      <p:par>
+        <p:cTn id="1" dur="indefinite" restart="never" nodeType="tmRoot"/>
+      </p:par>
+    </p:tnLst>
+  </p:timing>
 </p:sld>
 </file>
 

</xml_diff>

<commit_message>
Frage hinzugefügt - bitte kontrollieren
</commit_message>
<xml_diff>
--- a/Recap.pptx
+++ b/Recap.pptx
@@ -252,7 +252,7 @@
           <a:p>
             <a:fld id="{7FB8BD76-8AE1-44E3-82B2-43BE0E35BCF0}" type="datetimeFigureOut">
               <a:rPr lang="de-CH" smtClean="0"/>
-              <a:t>07.10.2014</a:t>
+              <a:t>08.10.2014</a:t>
             </a:fld>
             <a:endParaRPr lang="de-CH"/>
           </a:p>
@@ -422,7 +422,7 @@
           <a:p>
             <a:fld id="{7FB8BD76-8AE1-44E3-82B2-43BE0E35BCF0}" type="datetimeFigureOut">
               <a:rPr lang="de-CH" smtClean="0"/>
-              <a:t>07.10.2014</a:t>
+              <a:t>08.10.2014</a:t>
             </a:fld>
             <a:endParaRPr lang="de-CH"/>
           </a:p>
@@ -602,7 +602,7 @@
           <a:p>
             <a:fld id="{7FB8BD76-8AE1-44E3-82B2-43BE0E35BCF0}" type="datetimeFigureOut">
               <a:rPr lang="de-CH" smtClean="0"/>
-              <a:t>07.10.2014</a:t>
+              <a:t>08.10.2014</a:t>
             </a:fld>
             <a:endParaRPr lang="de-CH"/>
           </a:p>
@@ -772,7 +772,7 @@
           <a:p>
             <a:fld id="{7FB8BD76-8AE1-44E3-82B2-43BE0E35BCF0}" type="datetimeFigureOut">
               <a:rPr lang="de-CH" smtClean="0"/>
-              <a:t>07.10.2014</a:t>
+              <a:t>08.10.2014</a:t>
             </a:fld>
             <a:endParaRPr lang="de-CH"/>
           </a:p>
@@ -1018,7 +1018,7 @@
           <a:p>
             <a:fld id="{7FB8BD76-8AE1-44E3-82B2-43BE0E35BCF0}" type="datetimeFigureOut">
               <a:rPr lang="de-CH" smtClean="0"/>
-              <a:t>07.10.2014</a:t>
+              <a:t>08.10.2014</a:t>
             </a:fld>
             <a:endParaRPr lang="de-CH"/>
           </a:p>
@@ -1250,7 +1250,7 @@
           <a:p>
             <a:fld id="{7FB8BD76-8AE1-44E3-82B2-43BE0E35BCF0}" type="datetimeFigureOut">
               <a:rPr lang="de-CH" smtClean="0"/>
-              <a:t>07.10.2014</a:t>
+              <a:t>08.10.2014</a:t>
             </a:fld>
             <a:endParaRPr lang="de-CH"/>
           </a:p>
@@ -1617,7 +1617,7 @@
           <a:p>
             <a:fld id="{7FB8BD76-8AE1-44E3-82B2-43BE0E35BCF0}" type="datetimeFigureOut">
               <a:rPr lang="de-CH" smtClean="0"/>
-              <a:t>07.10.2014</a:t>
+              <a:t>08.10.2014</a:t>
             </a:fld>
             <a:endParaRPr lang="de-CH"/>
           </a:p>
@@ -1735,7 +1735,7 @@
           <a:p>
             <a:fld id="{7FB8BD76-8AE1-44E3-82B2-43BE0E35BCF0}" type="datetimeFigureOut">
               <a:rPr lang="de-CH" smtClean="0"/>
-              <a:t>07.10.2014</a:t>
+              <a:t>08.10.2014</a:t>
             </a:fld>
             <a:endParaRPr lang="de-CH"/>
           </a:p>
@@ -1830,7 +1830,7 @@
           <a:p>
             <a:fld id="{7FB8BD76-8AE1-44E3-82B2-43BE0E35BCF0}" type="datetimeFigureOut">
               <a:rPr lang="de-CH" smtClean="0"/>
-              <a:t>07.10.2014</a:t>
+              <a:t>08.10.2014</a:t>
             </a:fld>
             <a:endParaRPr lang="de-CH"/>
           </a:p>
@@ -2107,7 +2107,7 @@
           <a:p>
             <a:fld id="{7FB8BD76-8AE1-44E3-82B2-43BE0E35BCF0}" type="datetimeFigureOut">
               <a:rPr lang="de-CH" smtClean="0"/>
-              <a:t>07.10.2014</a:t>
+              <a:t>08.10.2014</a:t>
             </a:fld>
             <a:endParaRPr lang="de-CH"/>
           </a:p>
@@ -2360,7 +2360,7 @@
           <a:p>
             <a:fld id="{7FB8BD76-8AE1-44E3-82B2-43BE0E35BCF0}" type="datetimeFigureOut">
               <a:rPr lang="de-CH" smtClean="0"/>
-              <a:t>07.10.2014</a:t>
+              <a:t>08.10.2014</a:t>
             </a:fld>
             <a:endParaRPr lang="de-CH"/>
           </a:p>
@@ -2573,7 +2573,7 @@
           <a:p>
             <a:fld id="{7FB8BD76-8AE1-44E3-82B2-43BE0E35BCF0}" type="datetimeFigureOut">
               <a:rPr lang="de-CH" smtClean="0"/>
-              <a:t>07.10.2014</a:t>
+              <a:t>08.10.2014</a:t>
             </a:fld>
             <a:endParaRPr lang="de-CH"/>
           </a:p>
@@ -3511,7 +3511,6 @@
               <a:rPr lang="en-GB" dirty="0" smtClean="0"/>
               <a:t>separated</a:t>
             </a:r>
-            <a:endParaRPr lang="en-GB" dirty="0" smtClean="0"/>
           </a:p>
         </p:txBody>
       </p:sp>
@@ -5331,81 +5330,181 @@
           <a:chExt cx="0" cy="0"/>
         </a:xfrm>
       </p:grpSpPr>
-      <p:pic>
-        <p:nvPicPr>
-          <p:cNvPr id="7" name="Grafik 6"/>
-          <p:cNvPicPr>
-            <a:picLocks noChangeAspect="1"/>
-          </p:cNvPicPr>
-          <p:nvPr/>
-        </p:nvPicPr>
-        <p:blipFill>
-          <a:blip r:embed="rId2"/>
-          <a:stretch>
-            <a:fillRect/>
-          </a:stretch>
-        </p:blipFill>
+      <p:sp>
+        <p:nvSpPr>
+          <p:cNvPr id="2" name="Titel 1"/>
+          <p:cNvSpPr>
+            <a:spLocks noGrp="1"/>
+          </p:cNvSpPr>
+          <p:nvPr>
+            <p:ph type="title"/>
+          </p:nvPr>
+        </p:nvSpPr>
         <p:spPr>
           <a:xfrm>
-            <a:off x="671429" y="1015714"/>
-            <a:ext cx="4766203" cy="1009650"/>
+            <a:off x="826008" y="408570"/>
+            <a:ext cx="10515600" cy="542750"/>
           </a:xfrm>
-          <a:prstGeom prst="rect">
-            <a:avLst/>
-          </a:prstGeom>
         </p:spPr>
-      </p:pic>
-      <p:sp>
-        <p:nvSpPr>
-          <p:cNvPr id="2" name="Titel 1"/>
-          <p:cNvSpPr>
-            <a:spLocks noGrp="1"/>
-          </p:cNvSpPr>
-          <p:nvPr>
-            <p:ph type="title"/>
+        <p:txBody>
+          <a:bodyPr>
+            <a:normAutofit fontScale="90000"/>
+          </a:bodyPr>
+          <a:lstStyle/>
+          <a:p>
+            <a:r>
+              <a:rPr lang="de-CH" sz="4000" b="1" dirty="0" err="1" smtClean="0"/>
+              <a:t>Questions</a:t>
+            </a:r>
+            <a:endParaRPr lang="de-CH" dirty="0"/>
+          </a:p>
+        </p:txBody>
+      </p:sp>
+      <p:sp>
+        <p:nvSpPr>
+          <p:cNvPr id="3" name="Inhaltsplatzhalter 2"/>
+          <p:cNvSpPr>
+            <a:spLocks noGrp="1"/>
+          </p:cNvSpPr>
+          <p:nvPr>
+            <p:ph idx="1"/>
           </p:nvPr>
         </p:nvSpPr>
         <p:spPr>
           <a:xfrm>
-            <a:off x="826008" y="472964"/>
-            <a:ext cx="10515600" cy="1325563"/>
+            <a:off x="838200" y="1159099"/>
+            <a:ext cx="10515600" cy="5017864"/>
           </a:xfrm>
         </p:spPr>
         <p:txBody>
           <a:bodyPr>
-            <a:normAutofit/>
+            <a:normAutofit lnSpcReduction="10000"/>
           </a:bodyPr>
           <a:lstStyle/>
           <a:p>
             <a:r>
-              <a:rPr lang="de-CH" dirty="0"/>
-              <a:t/>
-            </a:r>
-            <a:br>
-              <a:rPr lang="de-CH" dirty="0"/>
-            </a:br>
-            <a:r>
-              <a:rPr lang="de-CH" sz="4000" b="1" dirty="0" err="1" smtClean="0"/>
-              <a:t>Questions</a:t>
-            </a:r>
+              <a:rPr lang="de-CH" dirty="0" err="1" smtClean="0"/>
+              <a:t>Which</a:t>
+            </a:r>
+            <a:r>
+              <a:rPr lang="de-CH" dirty="0" smtClean="0"/>
+              <a:t> type </a:t>
+            </a:r>
+            <a:r>
+              <a:rPr lang="de-CH" dirty="0" err="1" smtClean="0"/>
+              <a:t>of</a:t>
+            </a:r>
+            <a:r>
+              <a:rPr lang="de-CH" dirty="0" smtClean="0"/>
+              <a:t> </a:t>
+            </a:r>
+            <a:r>
+              <a:rPr lang="de-CH" dirty="0" err="1" smtClean="0"/>
+              <a:t>common</a:t>
+            </a:r>
+            <a:r>
+              <a:rPr lang="de-CH" dirty="0" smtClean="0"/>
+              <a:t> </a:t>
+            </a:r>
+            <a:r>
+              <a:rPr lang="de-CH" dirty="0" err="1" smtClean="0"/>
+              <a:t>files</a:t>
+            </a:r>
+            <a:r>
+              <a:rPr lang="de-CH" dirty="0" smtClean="0"/>
+              <a:t> </a:t>
+            </a:r>
+            <a:r>
+              <a:rPr lang="de-CH" dirty="0" err="1" smtClean="0"/>
+              <a:t>is</a:t>
+            </a:r>
+            <a:r>
+              <a:rPr lang="de-CH" dirty="0" smtClean="0"/>
+              <a:t> </a:t>
+            </a:r>
+            <a:r>
+              <a:rPr lang="de-CH" dirty="0" err="1" smtClean="0"/>
+              <a:t>used</a:t>
+            </a:r>
+            <a:r>
+              <a:rPr lang="de-CH" dirty="0" smtClean="0"/>
+              <a:t> </a:t>
+            </a:r>
+            <a:r>
+              <a:rPr lang="de-CH" dirty="0" err="1" smtClean="0"/>
+              <a:t>if</a:t>
+            </a:r>
+            <a:r>
+              <a:rPr lang="de-CH" dirty="0" smtClean="0"/>
+              <a:t> all </a:t>
+            </a:r>
+            <a:r>
+              <a:rPr lang="de-CH" dirty="0" err="1" smtClean="0"/>
+              <a:t>files</a:t>
+            </a:r>
+            <a:r>
+              <a:rPr lang="de-CH" dirty="0" smtClean="0"/>
+              <a:t> </a:t>
+            </a:r>
+            <a:r>
+              <a:rPr lang="de-CH" dirty="0" err="1" smtClean="0"/>
+              <a:t>should</a:t>
+            </a:r>
+            <a:r>
+              <a:rPr lang="de-CH" dirty="0" smtClean="0"/>
+              <a:t> </a:t>
+            </a:r>
+            <a:r>
+              <a:rPr lang="de-CH" dirty="0" err="1" smtClean="0"/>
+              <a:t>be</a:t>
+            </a:r>
+            <a:r>
+              <a:rPr lang="de-CH" dirty="0" smtClean="0"/>
+              <a:t> </a:t>
+            </a:r>
+            <a:r>
+              <a:rPr lang="de-CH" dirty="0" err="1" smtClean="0"/>
+              <a:t>stored</a:t>
+            </a:r>
+            <a:r>
+              <a:rPr lang="de-CH" dirty="0" smtClean="0"/>
+              <a:t> at </a:t>
+            </a:r>
+            <a:r>
+              <a:rPr lang="de-CH" dirty="0" err="1" smtClean="0"/>
+              <a:t>the</a:t>
+            </a:r>
+            <a:r>
+              <a:rPr lang="de-CH" dirty="0" smtClean="0"/>
+              <a:t> same </a:t>
+            </a:r>
+            <a:r>
+              <a:rPr lang="de-CH" dirty="0" err="1" smtClean="0"/>
+              <a:t>place</a:t>
+            </a:r>
+            <a:r>
+              <a:rPr lang="de-CH" dirty="0" smtClean="0"/>
+              <a:t>?</a:t>
+            </a:r>
+          </a:p>
+          <a:p>
+            <a:pPr lvl="1">
+              <a:buFont typeface="Wingdings" panose="05000000000000000000" pitchFamily="2" charset="2"/>
+              <a:buChar char="§"/>
+            </a:pPr>
+            <a:r>
+              <a:rPr lang="de-CH" dirty="0" smtClean="0"/>
+              <a:t>Library </a:t>
+            </a:r>
+            <a:r>
+              <a:rPr lang="de-CH" dirty="0" err="1" smtClean="0"/>
+              <a:t>Structure</a:t>
+            </a:r>
+            <a:endParaRPr lang="de-CH" dirty="0" smtClean="0"/>
+          </a:p>
+          <a:p>
             <a:endParaRPr lang="de-CH" dirty="0"/>
           </a:p>
-        </p:txBody>
-      </p:sp>
-      <p:sp>
-        <p:nvSpPr>
-          <p:cNvPr id="3" name="Inhaltsplatzhalter 2"/>
-          <p:cNvSpPr>
-            <a:spLocks noGrp="1"/>
-          </p:cNvSpPr>
-          <p:nvPr>
-            <p:ph idx="1"/>
-          </p:nvPr>
-        </p:nvSpPr>
-        <p:spPr/>
-        <p:txBody>
-          <a:bodyPr/>
-          <a:lstStyle/>
           <a:p>
             <a:r>
               <a:rPr lang="de-CH" dirty="0" err="1" smtClean="0"/>
@@ -5441,43 +5540,51 @@
             </a:r>
             <a:r>
               <a:rPr lang="de-CH" dirty="0" err="1" smtClean="0"/>
-              <a:t>is</a:t>
-            </a:r>
-            <a:r>
-              <a:rPr lang="de-CH" dirty="0" smtClean="0"/>
-              <a:t> </a:t>
-            </a:r>
-            <a:r>
-              <a:rPr lang="de-CH" dirty="0" err="1" smtClean="0"/>
-              <a:t>used</a:t>
-            </a:r>
-            <a:r>
-              <a:rPr lang="de-CH" dirty="0" smtClean="0"/>
-              <a:t> </a:t>
-            </a:r>
-            <a:r>
-              <a:rPr lang="de-CH" dirty="0" err="1" smtClean="0"/>
-              <a:t>if</a:t>
-            </a:r>
-            <a:r>
-              <a:rPr lang="de-CH" dirty="0" smtClean="0"/>
-              <a:t> all </a:t>
-            </a:r>
-            <a:r>
-              <a:rPr lang="de-CH" dirty="0" err="1" smtClean="0"/>
-              <a:t>files</a:t>
-            </a:r>
-            <a:r>
-              <a:rPr lang="de-CH" dirty="0" smtClean="0"/>
-              <a:t> </a:t>
-            </a:r>
-            <a:r>
-              <a:rPr lang="de-CH" dirty="0" err="1" smtClean="0"/>
-              <a:t>should</a:t>
-            </a:r>
-            <a:r>
-              <a:rPr lang="de-CH" dirty="0" smtClean="0"/>
-              <a:t> </a:t>
+              <a:t>have</a:t>
+            </a:r>
+            <a:r>
+              <a:rPr lang="de-CH" dirty="0" smtClean="0"/>
+              <a:t> </a:t>
+            </a:r>
+            <a:r>
+              <a:rPr lang="de-CH" dirty="0" err="1" smtClean="0"/>
+              <a:t>the</a:t>
+            </a:r>
+            <a:r>
+              <a:rPr lang="de-CH" dirty="0" smtClean="0"/>
+              <a:t> </a:t>
+            </a:r>
+            <a:r>
+              <a:rPr lang="de-CH" dirty="0" err="1" smtClean="0"/>
+              <a:t>disadvantage</a:t>
+            </a:r>
+            <a:r>
+              <a:rPr lang="de-CH" dirty="0" smtClean="0"/>
+              <a:t> </a:t>
+            </a:r>
+            <a:r>
+              <a:rPr lang="de-CH" dirty="0" err="1" smtClean="0"/>
+              <a:t>that</a:t>
+            </a:r>
+            <a:r>
+              <a:rPr lang="de-CH" dirty="0" smtClean="0"/>
+              <a:t> </a:t>
+            </a:r>
+            <a:r>
+              <a:rPr lang="de-CH" dirty="0" err="1" smtClean="0"/>
+              <a:t>changes</a:t>
+            </a:r>
+            <a:r>
+              <a:rPr lang="de-CH" dirty="0" smtClean="0"/>
+              <a:t> </a:t>
+            </a:r>
+            <a:r>
+              <a:rPr lang="de-CH" dirty="0" err="1" smtClean="0"/>
+              <a:t>need</a:t>
+            </a:r>
+            <a:r>
+              <a:rPr lang="de-CH" dirty="0" smtClean="0"/>
+              <a:t> an </a:t>
             </a:r>
             <a:r>
               <a:rPr lang="de-CH" dirty="0" err="1" smtClean="0"/>
@@ -5489,113 +5596,118 @@
             </a:r>
             <a:r>
               <a:rPr lang="de-CH" dirty="0" err="1" smtClean="0"/>
-              <a:t>stored</a:t>
-            </a:r>
-            <a:r>
-              <a:rPr lang="de-CH" dirty="0" smtClean="0"/>
-              <a:t> at </a:t>
-            </a:r>
-            <a:r>
-              <a:rPr lang="de-CH" dirty="0" err="1" smtClean="0"/>
-              <a:t>the</a:t>
-            </a:r>
-            <a:r>
-              <a:rPr lang="de-CH" dirty="0" smtClean="0"/>
-              <a:t> same </a:t>
-            </a:r>
-            <a:r>
-              <a:rPr lang="de-CH" dirty="0" err="1" smtClean="0"/>
-              <a:t>place</a:t>
+              <a:t>done</a:t>
+            </a:r>
+            <a:r>
+              <a:rPr lang="de-CH" dirty="0" smtClean="0"/>
+              <a:t> in </a:t>
+            </a:r>
+            <a:r>
+              <a:rPr lang="de-CH" dirty="0" err="1" smtClean="0"/>
+              <a:t>more</a:t>
+            </a:r>
+            <a:r>
+              <a:rPr lang="de-CH" dirty="0" smtClean="0"/>
+              <a:t> </a:t>
+            </a:r>
+            <a:r>
+              <a:rPr lang="de-CH" dirty="0" err="1" smtClean="0"/>
+              <a:t>than</a:t>
+            </a:r>
+            <a:r>
+              <a:rPr lang="de-CH" dirty="0" smtClean="0"/>
+              <a:t> </a:t>
+            </a:r>
+            <a:r>
+              <a:rPr lang="de-CH" dirty="0" err="1" smtClean="0"/>
+              <a:t>one</a:t>
+            </a:r>
+            <a:r>
+              <a:rPr lang="de-CH" dirty="0" smtClean="0"/>
+              <a:t> </a:t>
+            </a:r>
+            <a:r>
+              <a:rPr lang="de-CH" dirty="0" err="1" smtClean="0"/>
+              <a:t>file</a:t>
             </a:r>
             <a:r>
               <a:rPr lang="de-CH" dirty="0" smtClean="0"/>
               <a:t>?</a:t>
             </a:r>
+          </a:p>
+          <a:p>
+            <a:pPr marL="800100" lvl="2" indent="-342900">
+              <a:spcBef>
+                <a:spcPts val="1000"/>
+              </a:spcBef>
+              <a:buFont typeface="Wingdings" panose="05000000000000000000" pitchFamily="2" charset="2"/>
+              <a:buChar char="§"/>
+            </a:pPr>
+            <a:r>
+              <a:rPr lang="de-CH" sz="2400" dirty="0" err="1" smtClean="0"/>
+              <a:t>Copy</a:t>
+            </a:r>
+            <a:r>
+              <a:rPr lang="de-CH" sz="2400" dirty="0" smtClean="0"/>
+              <a:t> </a:t>
+            </a:r>
+            <a:r>
+              <a:rPr lang="de-CH" sz="2400" dirty="0" err="1" smtClean="0"/>
+              <a:t>Structure</a:t>
+            </a:r>
             <a:endParaRPr lang="de-CH" dirty="0" smtClean="0"/>
           </a:p>
           <a:p>
-            <a:endParaRPr lang="de-CH" dirty="0"/>
-          </a:p>
-          <a:p>
-            <a:r>
-              <a:rPr lang="de-CH" dirty="0" err="1" smtClean="0"/>
-              <a:t>Which</a:t>
-            </a:r>
-            <a:r>
-              <a:rPr lang="de-CH" dirty="0" smtClean="0"/>
-              <a:t> type </a:t>
-            </a:r>
-            <a:r>
-              <a:rPr lang="de-CH" dirty="0" err="1" smtClean="0"/>
-              <a:t>of</a:t>
-            </a:r>
-            <a:r>
-              <a:rPr lang="de-CH" dirty="0" smtClean="0"/>
-              <a:t> </a:t>
-            </a:r>
-            <a:r>
-              <a:rPr lang="de-CH" dirty="0" err="1" smtClean="0"/>
-              <a:t>common</a:t>
-            </a:r>
-            <a:r>
-              <a:rPr lang="de-CH" dirty="0" smtClean="0"/>
-              <a:t> </a:t>
-            </a:r>
-            <a:r>
-              <a:rPr lang="de-CH" dirty="0" err="1" smtClean="0"/>
-              <a:t>files</a:t>
-            </a:r>
-            <a:r>
-              <a:rPr lang="de-CH" dirty="0" smtClean="0"/>
-              <a:t> </a:t>
-            </a:r>
-            <a:r>
-              <a:rPr lang="de-CH" dirty="0" err="1" smtClean="0"/>
-              <a:t>have</a:t>
-            </a:r>
-            <a:r>
-              <a:rPr lang="de-CH" dirty="0" smtClean="0"/>
-              <a:t> </a:t>
-            </a:r>
-            <a:r>
-              <a:rPr lang="de-CH" dirty="0" err="1" smtClean="0"/>
-              <a:t>the</a:t>
-            </a:r>
-            <a:r>
-              <a:rPr lang="de-CH" dirty="0" smtClean="0"/>
-              <a:t> </a:t>
-            </a:r>
-            <a:r>
-              <a:rPr lang="de-CH" dirty="0" err="1" smtClean="0"/>
-              <a:t>disadvantage</a:t>
-            </a:r>
-            <a:r>
-              <a:rPr lang="de-CH" dirty="0" smtClean="0"/>
-              <a:t> </a:t>
-            </a:r>
-            <a:r>
-              <a:rPr lang="de-CH" dirty="0" err="1" smtClean="0"/>
-              <a:t>that</a:t>
-            </a:r>
-            <a:r>
-              <a:rPr lang="de-CH" dirty="0" smtClean="0"/>
-              <a:t> </a:t>
-            </a:r>
-            <a:r>
-              <a:rPr lang="de-CH" dirty="0" err="1" smtClean="0"/>
-              <a:t>changes</a:t>
-            </a:r>
-            <a:r>
-              <a:rPr lang="de-CH" dirty="0" smtClean="0"/>
-              <a:t> </a:t>
-            </a:r>
-            <a:r>
-              <a:rPr lang="de-CH" dirty="0" err="1" smtClean="0"/>
-              <a:t>need</a:t>
-            </a:r>
-            <a:r>
-              <a:rPr lang="de-CH" dirty="0" smtClean="0"/>
-              <a:t> an </a:t>
+            <a:endParaRPr lang="de-CH" dirty="0" smtClean="0"/>
+          </a:p>
+          <a:p>
+            <a:r>
+              <a:rPr lang="de-CH" dirty="0" err="1" smtClean="0"/>
+              <a:t>name</a:t>
+            </a:r>
+            <a:r>
+              <a:rPr lang="de-CH" dirty="0" smtClean="0"/>
+              <a:t> </a:t>
+            </a:r>
+            <a:r>
+              <a:rPr lang="de-CH" dirty="0" err="1" smtClean="0"/>
+              <a:t>three</a:t>
+            </a:r>
+            <a:r>
+              <a:rPr lang="de-CH" dirty="0" smtClean="0"/>
+              <a:t> </a:t>
+            </a:r>
+            <a:r>
+              <a:rPr lang="de-CH" dirty="0" err="1" smtClean="0"/>
+              <a:t>reasons</a:t>
+            </a:r>
+            <a:r>
+              <a:rPr lang="de-CH" dirty="0" smtClean="0"/>
+              <a:t> </a:t>
+            </a:r>
+            <a:r>
+              <a:rPr lang="de-CH" dirty="0" err="1" smtClean="0"/>
+              <a:t>why</a:t>
+            </a:r>
+            <a:r>
+              <a:rPr lang="de-CH" dirty="0" smtClean="0"/>
+              <a:t> </a:t>
+            </a:r>
+            <a:r>
+              <a:rPr lang="de-CH" dirty="0" err="1" smtClean="0"/>
+              <a:t>project</a:t>
+            </a:r>
+            <a:r>
+              <a:rPr lang="de-CH" dirty="0" smtClean="0"/>
+              <a:t> </a:t>
+            </a:r>
+            <a:r>
+              <a:rPr lang="de-CH" dirty="0" err="1" smtClean="0"/>
+              <a:t>stould</a:t>
+            </a:r>
+            <a:r>
+              <a:rPr lang="de-CH" dirty="0" smtClean="0"/>
+              <a:t> </a:t>
             </a:r>
             <a:r>
               <a:rPr lang="de-CH" dirty="0" err="1" smtClean="0"/>
@@ -5607,43 +5719,7 @@
             </a:r>
             <a:r>
               <a:rPr lang="de-CH" dirty="0" err="1" smtClean="0"/>
-              <a:t>done</a:t>
-            </a:r>
-            <a:r>
-              <a:rPr lang="de-CH" dirty="0" smtClean="0"/>
-              <a:t> </a:t>
-            </a:r>
-            <a:r>
-              <a:rPr lang="de-CH" dirty="0" smtClean="0"/>
-              <a:t>in </a:t>
-            </a:r>
-            <a:r>
-              <a:rPr lang="de-CH" dirty="0" err="1" smtClean="0"/>
-              <a:t>more</a:t>
-            </a:r>
-            <a:r>
-              <a:rPr lang="de-CH" dirty="0" smtClean="0"/>
-              <a:t> </a:t>
-            </a:r>
-            <a:r>
-              <a:rPr lang="de-CH" dirty="0" err="1" smtClean="0"/>
-              <a:t>than</a:t>
-            </a:r>
-            <a:r>
-              <a:rPr lang="de-CH" dirty="0" smtClean="0"/>
-              <a:t> </a:t>
-            </a:r>
-            <a:r>
-              <a:rPr lang="de-CH" dirty="0" err="1" smtClean="0"/>
-              <a:t>one</a:t>
-            </a:r>
-            <a:r>
-              <a:rPr lang="de-CH" dirty="0" smtClean="0"/>
-              <a:t> </a:t>
-            </a:r>
-            <a:r>
-              <a:rPr lang="de-CH" dirty="0" err="1" smtClean="0"/>
-              <a:t>file</a:t>
+              <a:t>structured</a:t>
             </a:r>
             <a:r>
               <a:rPr lang="de-CH" dirty="0" smtClean="0"/>
@@ -5651,73 +5727,94 @@
             </a:r>
           </a:p>
           <a:p>
+            <a:pPr lvl="1">
+              <a:buFont typeface="Wingdings" panose="05000000000000000000" pitchFamily="2" charset="2"/>
+              <a:buChar char="§"/>
+            </a:pPr>
+            <a:r>
+              <a:rPr lang="de-CH" dirty="0" err="1"/>
+              <a:t>e</a:t>
+            </a:r>
+            <a:r>
+              <a:rPr lang="de-CH" dirty="0" err="1" smtClean="0"/>
+              <a:t>asier</a:t>
+            </a:r>
+            <a:r>
+              <a:rPr lang="de-CH" dirty="0" smtClean="0"/>
+              <a:t> </a:t>
+            </a:r>
+            <a:r>
+              <a:rPr lang="de-CH" dirty="0" err="1" smtClean="0"/>
+              <a:t>to</a:t>
+            </a:r>
+            <a:r>
+              <a:rPr lang="de-CH" dirty="0" smtClean="0"/>
+              <a:t> </a:t>
+            </a:r>
+            <a:r>
+              <a:rPr lang="de-CH" dirty="0" err="1" smtClean="0"/>
+              <a:t>read</a:t>
+            </a:r>
             <a:endParaRPr lang="de-CH" dirty="0" smtClean="0"/>
           </a:p>
           <a:p>
-            <a:r>
-              <a:rPr lang="de-CH" dirty="0" err="1" smtClean="0"/>
-              <a:t>name</a:t>
-            </a:r>
-            <a:r>
-              <a:rPr lang="de-CH" dirty="0" smtClean="0"/>
-              <a:t> </a:t>
-            </a:r>
-            <a:r>
-              <a:rPr lang="de-CH" dirty="0" err="1" smtClean="0"/>
-              <a:t>three</a:t>
-            </a:r>
-            <a:r>
-              <a:rPr lang="de-CH" dirty="0" smtClean="0"/>
-              <a:t> </a:t>
-            </a:r>
-            <a:r>
-              <a:rPr lang="de-CH" dirty="0" err="1" smtClean="0"/>
-              <a:t>reasons</a:t>
-            </a:r>
-            <a:r>
-              <a:rPr lang="de-CH" dirty="0" smtClean="0"/>
-              <a:t> </a:t>
-            </a:r>
-            <a:r>
-              <a:rPr lang="de-CH" dirty="0" err="1" smtClean="0"/>
-              <a:t>why</a:t>
-            </a:r>
-            <a:r>
-              <a:rPr lang="de-CH" dirty="0" smtClean="0"/>
-              <a:t> </a:t>
-            </a:r>
-            <a:r>
-              <a:rPr lang="de-CH" dirty="0" err="1" smtClean="0"/>
-              <a:t>project</a:t>
-            </a:r>
-            <a:r>
-              <a:rPr lang="de-CH" dirty="0" smtClean="0"/>
-              <a:t> </a:t>
-            </a:r>
-            <a:r>
-              <a:rPr lang="de-CH" dirty="0" err="1" smtClean="0"/>
-              <a:t>stould</a:t>
-            </a:r>
-            <a:r>
-              <a:rPr lang="de-CH" dirty="0" smtClean="0"/>
-              <a:t> </a:t>
-            </a:r>
-            <a:r>
-              <a:rPr lang="de-CH" dirty="0" err="1" smtClean="0"/>
-              <a:t>be</a:t>
-            </a:r>
-            <a:r>
-              <a:rPr lang="de-CH" dirty="0" smtClean="0"/>
-              <a:t> </a:t>
-            </a:r>
-            <a:r>
-              <a:rPr lang="de-CH" dirty="0" err="1" smtClean="0"/>
-              <a:t>structured</a:t>
-            </a:r>
-            <a:r>
-              <a:rPr lang="de-CH" dirty="0" smtClean="0"/>
-              <a:t>?</a:t>
-            </a:r>
+            <a:pPr lvl="1">
+              <a:buFont typeface="Wingdings" panose="05000000000000000000" pitchFamily="2" charset="2"/>
+              <a:buChar char="§"/>
+            </a:pPr>
+            <a:r>
+              <a:rPr lang="de-CH" dirty="0" err="1"/>
+              <a:t>r</a:t>
+            </a:r>
+            <a:r>
+              <a:rPr lang="de-CH" dirty="0" err="1" smtClean="0"/>
+              <a:t>eusability</a:t>
+            </a:r>
+            <a:endParaRPr lang="de-CH" dirty="0" smtClean="0"/>
+          </a:p>
+          <a:p>
+            <a:pPr lvl="1">
+              <a:buFont typeface="Wingdings" panose="05000000000000000000" pitchFamily="2" charset="2"/>
+              <a:buChar char="§"/>
+            </a:pPr>
+            <a:r>
+              <a:rPr lang="de-CH" dirty="0" err="1"/>
+              <a:t>e</a:t>
+            </a:r>
+            <a:r>
+              <a:rPr lang="de-CH" dirty="0" err="1" smtClean="0"/>
+              <a:t>asier</a:t>
+            </a:r>
+            <a:r>
+              <a:rPr lang="de-CH" dirty="0" smtClean="0"/>
+              <a:t> </a:t>
+            </a:r>
+            <a:r>
+              <a:rPr lang="de-CH" dirty="0" err="1" smtClean="0"/>
+              <a:t>to</a:t>
+            </a:r>
+            <a:r>
+              <a:rPr lang="de-CH" dirty="0" smtClean="0"/>
+              <a:t> </a:t>
+            </a:r>
+            <a:r>
+              <a:rPr lang="de-CH" dirty="0" err="1" smtClean="0"/>
+              <a:t>understand</a:t>
+            </a:r>
+            <a:endParaRPr lang="de-CH" dirty="0" smtClean="0"/>
+          </a:p>
+          <a:p>
+            <a:pPr lvl="1">
+              <a:buFont typeface="Wingdings" panose="05000000000000000000" pitchFamily="2" charset="2"/>
+              <a:buChar char="§"/>
+            </a:pPr>
+            <a:endParaRPr lang="de-CH" dirty="0" smtClean="0"/>
+          </a:p>
+          <a:p>
+            <a:pPr lvl="1">
+              <a:buFont typeface="Wingdings" panose="05000000000000000000" pitchFamily="2" charset="2"/>
+              <a:buChar char="§"/>
+            </a:pPr>
             <a:endParaRPr lang="de-CH" dirty="0" smtClean="0"/>
           </a:p>
         </p:txBody>
@@ -5759,203 +5856,490 @@
           <a:chExt cx="0" cy="0"/>
         </a:xfrm>
       </p:grpSpPr>
-      <p:pic>
-        <p:nvPicPr>
-          <p:cNvPr id="7" name="Grafik 6"/>
-          <p:cNvPicPr>
-            <a:picLocks noChangeAspect="1"/>
-          </p:cNvPicPr>
-          <p:nvPr/>
-        </p:nvPicPr>
-        <p:blipFill>
-          <a:blip r:embed="rId2"/>
-          <a:stretch>
-            <a:fillRect/>
-          </a:stretch>
-        </p:blipFill>
+      <p:sp>
+        <p:nvSpPr>
+          <p:cNvPr id="3" name="Inhaltsplatzhalter 2"/>
+          <p:cNvSpPr>
+            <a:spLocks noGrp="1"/>
+          </p:cNvSpPr>
+          <p:nvPr>
+            <p:ph idx="1"/>
+          </p:nvPr>
+        </p:nvSpPr>
         <p:spPr>
           <a:xfrm>
-            <a:off x="671429" y="1015714"/>
-            <a:ext cx="4766203" cy="1009650"/>
+            <a:off x="838200" y="1130170"/>
+            <a:ext cx="10515600" cy="4351338"/>
+          </a:xfrm>
+        </p:spPr>
+        <p:txBody>
+          <a:bodyPr/>
+          <a:lstStyle/>
+          <a:p>
+            <a:r>
+              <a:rPr lang="de-CH" dirty="0" err="1" smtClean="0"/>
+              <a:t>What</a:t>
+            </a:r>
+            <a:r>
+              <a:rPr lang="de-CH" dirty="0" smtClean="0"/>
+              <a:t> do </a:t>
+            </a:r>
+            <a:r>
+              <a:rPr lang="de-CH" dirty="0" err="1" smtClean="0"/>
+              <a:t>you</a:t>
+            </a:r>
+            <a:r>
+              <a:rPr lang="de-CH" dirty="0" smtClean="0"/>
+              <a:t> </a:t>
+            </a:r>
+            <a:r>
+              <a:rPr lang="de-CH" dirty="0" err="1" smtClean="0"/>
+              <a:t>need</a:t>
+            </a:r>
+            <a:r>
+              <a:rPr lang="de-CH" dirty="0" smtClean="0"/>
+              <a:t> </a:t>
+            </a:r>
+            <a:r>
+              <a:rPr lang="de-CH" dirty="0" err="1" smtClean="0"/>
+              <a:t>to</a:t>
+            </a:r>
+            <a:r>
+              <a:rPr lang="de-CH" dirty="0" smtClean="0"/>
+              <a:t> </a:t>
+            </a:r>
+            <a:r>
+              <a:rPr lang="de-CH" dirty="0" err="1" smtClean="0"/>
+              <a:t>add</a:t>
+            </a:r>
+            <a:r>
+              <a:rPr lang="de-CH" dirty="0" smtClean="0"/>
+              <a:t> in </a:t>
+            </a:r>
+            <a:r>
+              <a:rPr lang="de-CH" dirty="0" err="1" smtClean="0"/>
+              <a:t>the</a:t>
+            </a:r>
+            <a:r>
+              <a:rPr lang="de-CH" dirty="0" smtClean="0"/>
+              <a:t> relative </a:t>
+            </a:r>
+            <a:r>
+              <a:rPr lang="de-CH" dirty="0" err="1" smtClean="0"/>
+              <a:t>project</a:t>
+            </a:r>
+            <a:r>
+              <a:rPr lang="de-CH" dirty="0" smtClean="0"/>
+              <a:t> </a:t>
+            </a:r>
+            <a:r>
+              <a:rPr lang="de-CH" dirty="0" err="1" smtClean="0"/>
+              <a:t>location</a:t>
+            </a:r>
+            <a:r>
+              <a:rPr lang="de-CH" dirty="0" smtClean="0"/>
+              <a:t> </a:t>
+            </a:r>
+            <a:r>
+              <a:rPr lang="de-CH" dirty="0" err="1" smtClean="0"/>
+              <a:t>to</a:t>
+            </a:r>
+            <a:r>
+              <a:rPr lang="de-CH" dirty="0" smtClean="0"/>
+              <a:t> </a:t>
+            </a:r>
+            <a:r>
+              <a:rPr lang="de-CH" dirty="0" err="1" smtClean="0"/>
+              <a:t>move</a:t>
+            </a:r>
+            <a:r>
+              <a:rPr lang="de-CH" dirty="0" smtClean="0"/>
+              <a:t> </a:t>
+            </a:r>
+            <a:r>
+              <a:rPr lang="de-CH" dirty="0" err="1" smtClean="0"/>
+              <a:t>up</a:t>
+            </a:r>
+            <a:r>
+              <a:rPr lang="de-CH" dirty="0" smtClean="0"/>
+              <a:t> </a:t>
+            </a:r>
+            <a:r>
+              <a:rPr lang="de-CH" dirty="0" err="1" smtClean="0"/>
+              <a:t>one</a:t>
+            </a:r>
+            <a:r>
+              <a:rPr lang="de-CH" dirty="0" smtClean="0"/>
+              <a:t> </a:t>
+            </a:r>
+            <a:r>
+              <a:rPr lang="de-CH" dirty="0" err="1" smtClean="0"/>
+              <a:t>step</a:t>
+            </a:r>
+            <a:r>
+              <a:rPr lang="de-CH" dirty="0" smtClean="0"/>
+              <a:t> in </a:t>
+            </a:r>
+            <a:r>
+              <a:rPr lang="de-CH" dirty="0" err="1" smtClean="0"/>
+              <a:t>the</a:t>
+            </a:r>
+            <a:r>
+              <a:rPr lang="de-CH" dirty="0" smtClean="0"/>
+              <a:t> </a:t>
+            </a:r>
+            <a:r>
+              <a:rPr lang="de-CH" dirty="0" err="1" smtClean="0"/>
+              <a:t>folder</a:t>
+            </a:r>
+            <a:r>
+              <a:rPr lang="de-CH" dirty="0" smtClean="0"/>
+              <a:t> </a:t>
+            </a:r>
+            <a:r>
+              <a:rPr lang="de-CH" dirty="0" err="1" smtClean="0"/>
+              <a:t>directory</a:t>
+            </a:r>
+            <a:r>
+              <a:rPr lang="de-CH" dirty="0" smtClean="0"/>
+              <a:t>?</a:t>
+            </a:r>
+          </a:p>
+          <a:p>
+            <a:pPr lvl="1">
+              <a:buFont typeface="Wingdings" panose="05000000000000000000" pitchFamily="2" charset="2"/>
+              <a:buChar char="§"/>
+            </a:pPr>
+            <a:r>
+              <a:rPr lang="de-CH" dirty="0" smtClean="0"/>
+              <a:t>/..</a:t>
+            </a:r>
+          </a:p>
+          <a:p>
+            <a:pPr lvl="1">
+              <a:buFont typeface="Wingdings" panose="05000000000000000000" pitchFamily="2" charset="2"/>
+              <a:buChar char="§"/>
+            </a:pPr>
+            <a:r>
+              <a:rPr lang="de-CH" dirty="0" err="1" smtClean="0"/>
+              <a:t>It</a:t>
+            </a:r>
+            <a:r>
+              <a:rPr lang="de-CH" dirty="0" smtClean="0"/>
+              <a:t> </a:t>
+            </a:r>
+            <a:r>
+              <a:rPr lang="de-CH" dirty="0" err="1" smtClean="0"/>
+              <a:t>moves</a:t>
+            </a:r>
+            <a:r>
+              <a:rPr lang="de-CH" dirty="0" smtClean="0"/>
+              <a:t> </a:t>
+            </a:r>
+            <a:r>
+              <a:rPr lang="de-CH" dirty="0" err="1" smtClean="0"/>
+              <a:t>up</a:t>
+            </a:r>
+            <a:r>
+              <a:rPr lang="de-CH" dirty="0" smtClean="0"/>
+              <a:t> per </a:t>
+            </a:r>
+            <a:r>
+              <a:rPr lang="de-CH" dirty="0" err="1" smtClean="0"/>
+              <a:t>each</a:t>
+            </a:r>
+            <a:r>
+              <a:rPr lang="de-CH" dirty="0" smtClean="0"/>
+              <a:t> «/..»</a:t>
+            </a:r>
+          </a:p>
+          <a:p>
+            <a:pPr lvl="1">
+              <a:buFont typeface="Wingdings" panose="05000000000000000000" pitchFamily="2" charset="2"/>
+              <a:buChar char="§"/>
+            </a:pPr>
+            <a:endParaRPr lang="de-CH" sz="2200" dirty="0"/>
+          </a:p>
+          <a:p>
+            <a:r>
+              <a:rPr lang="de-CH" dirty="0" err="1" smtClean="0"/>
+              <a:t>What</a:t>
+            </a:r>
+            <a:r>
+              <a:rPr lang="de-CH" dirty="0" smtClean="0"/>
+              <a:t> </a:t>
+            </a:r>
+            <a:r>
+              <a:rPr lang="de-CH" dirty="0" err="1" smtClean="0"/>
+              <a:t>happens</a:t>
+            </a:r>
+            <a:r>
+              <a:rPr lang="de-CH" dirty="0" smtClean="0"/>
+              <a:t> </a:t>
+            </a:r>
+            <a:r>
+              <a:rPr lang="de-CH" dirty="0" err="1" smtClean="0"/>
+              <a:t>if</a:t>
+            </a:r>
+            <a:r>
+              <a:rPr lang="de-CH" dirty="0" smtClean="0"/>
+              <a:t> </a:t>
+            </a:r>
+            <a:r>
+              <a:rPr lang="de-CH" dirty="0" err="1" smtClean="0"/>
+              <a:t>you</a:t>
+            </a:r>
+            <a:r>
+              <a:rPr lang="de-CH" dirty="0" smtClean="0"/>
+              <a:t> </a:t>
+            </a:r>
+            <a:r>
+              <a:rPr lang="de-CH" dirty="0" err="1" smtClean="0"/>
+              <a:t>share</a:t>
+            </a:r>
+            <a:r>
+              <a:rPr lang="de-CH" dirty="0" smtClean="0"/>
+              <a:t> </a:t>
+            </a:r>
+            <a:r>
+              <a:rPr lang="de-CH" dirty="0" err="1" smtClean="0"/>
+              <a:t>datas</a:t>
+            </a:r>
+            <a:r>
+              <a:rPr lang="de-CH" dirty="0" smtClean="0"/>
+              <a:t> </a:t>
+            </a:r>
+            <a:r>
+              <a:rPr lang="de-CH" dirty="0" err="1" smtClean="0"/>
+              <a:t>while</a:t>
+            </a:r>
+            <a:r>
+              <a:rPr lang="de-CH" dirty="0" smtClean="0"/>
+              <a:t> </a:t>
+            </a:r>
+            <a:r>
+              <a:rPr lang="de-CH" dirty="0" err="1" smtClean="0"/>
+              <a:t>use</a:t>
+            </a:r>
+            <a:r>
+              <a:rPr lang="de-CH" dirty="0" smtClean="0"/>
+              <a:t> absolut </a:t>
+            </a:r>
+            <a:r>
+              <a:rPr lang="de-CH" dirty="0" err="1" smtClean="0"/>
+              <a:t>project</a:t>
+            </a:r>
+            <a:r>
+              <a:rPr lang="de-CH" dirty="0" smtClean="0"/>
+              <a:t> </a:t>
+            </a:r>
+            <a:r>
+              <a:rPr lang="de-CH" dirty="0" err="1" smtClean="0"/>
+              <a:t>locations</a:t>
+            </a:r>
+            <a:r>
+              <a:rPr lang="de-CH" dirty="0" smtClean="0"/>
+              <a:t>?</a:t>
+            </a:r>
+          </a:p>
+          <a:p>
+            <a:pPr lvl="1">
+              <a:buFont typeface="Wingdings" panose="05000000000000000000" pitchFamily="2" charset="2"/>
+              <a:buChar char="§"/>
+            </a:pPr>
+            <a:r>
+              <a:rPr lang="de-CH" dirty="0" err="1" smtClean="0"/>
+              <a:t>If</a:t>
+            </a:r>
+            <a:r>
+              <a:rPr lang="de-CH" dirty="0" smtClean="0"/>
+              <a:t> </a:t>
+            </a:r>
+            <a:r>
+              <a:rPr lang="de-CH" dirty="0" err="1" smtClean="0"/>
+              <a:t>your</a:t>
+            </a:r>
+            <a:r>
+              <a:rPr lang="de-CH" dirty="0" smtClean="0"/>
+              <a:t> </a:t>
+            </a:r>
+            <a:r>
+              <a:rPr lang="de-CH" dirty="0" err="1" smtClean="0"/>
+              <a:t>friend</a:t>
+            </a:r>
+            <a:r>
+              <a:rPr lang="de-CH" dirty="0" smtClean="0"/>
+              <a:t> </a:t>
+            </a:r>
+            <a:r>
+              <a:rPr lang="de-CH" dirty="0" err="1" smtClean="0"/>
+              <a:t>tries</a:t>
+            </a:r>
+            <a:r>
+              <a:rPr lang="de-CH" dirty="0" smtClean="0"/>
+              <a:t> </a:t>
+            </a:r>
+            <a:r>
+              <a:rPr lang="de-CH" dirty="0" err="1" smtClean="0"/>
+              <a:t>to</a:t>
+            </a:r>
+            <a:r>
+              <a:rPr lang="de-CH" dirty="0" smtClean="0"/>
+              <a:t> </a:t>
+            </a:r>
+            <a:r>
+              <a:rPr lang="de-CH" dirty="0" err="1" smtClean="0"/>
+              <a:t>compile</a:t>
+            </a:r>
+            <a:r>
+              <a:rPr lang="de-CH" dirty="0" smtClean="0"/>
+              <a:t> he will </a:t>
+            </a:r>
+            <a:r>
+              <a:rPr lang="de-CH" dirty="0" err="1" smtClean="0"/>
+              <a:t>have</a:t>
+            </a:r>
+            <a:r>
+              <a:rPr lang="de-CH" dirty="0" smtClean="0"/>
+              <a:t> </a:t>
+            </a:r>
+            <a:r>
+              <a:rPr lang="de-CH" dirty="0" err="1" smtClean="0"/>
+              <a:t>some</a:t>
+            </a:r>
+            <a:r>
+              <a:rPr lang="de-CH" dirty="0" smtClean="0"/>
+              <a:t> </a:t>
+            </a:r>
+            <a:r>
+              <a:rPr lang="de-CH" dirty="0" err="1" smtClean="0"/>
+              <a:t>troubles</a:t>
+            </a:r>
+            <a:r>
+              <a:rPr lang="de-CH" dirty="0" smtClean="0"/>
+              <a:t>, </a:t>
+            </a:r>
+            <a:r>
+              <a:rPr lang="de-CH" dirty="0" err="1" smtClean="0"/>
+              <a:t>if</a:t>
+            </a:r>
+            <a:r>
+              <a:rPr lang="de-CH" dirty="0" smtClean="0"/>
+              <a:t> he </a:t>
+            </a:r>
+            <a:r>
+              <a:rPr lang="de-CH" dirty="0" err="1" smtClean="0"/>
+              <a:t>don’t</a:t>
+            </a:r>
+            <a:r>
+              <a:rPr lang="de-CH" dirty="0" smtClean="0"/>
+              <a:t> </a:t>
+            </a:r>
+            <a:r>
+              <a:rPr lang="de-CH" dirty="0" err="1" smtClean="0"/>
+              <a:t>have</a:t>
+            </a:r>
+            <a:r>
+              <a:rPr lang="de-CH" dirty="0" smtClean="0"/>
+              <a:t> </a:t>
+            </a:r>
+            <a:r>
+              <a:rPr lang="de-CH" dirty="0" err="1" smtClean="0"/>
+              <a:t>exaclty</a:t>
+            </a:r>
+            <a:r>
+              <a:rPr lang="de-CH" dirty="0" smtClean="0"/>
+              <a:t> </a:t>
+            </a:r>
+            <a:r>
+              <a:rPr lang="de-CH" dirty="0" err="1" smtClean="0"/>
+              <a:t>the</a:t>
+            </a:r>
+            <a:r>
+              <a:rPr lang="de-CH" dirty="0" smtClean="0"/>
+              <a:t> same </a:t>
+            </a:r>
+            <a:r>
+              <a:rPr lang="de-CH" dirty="0" err="1" smtClean="0"/>
+              <a:t>path</a:t>
+            </a:r>
+            <a:r>
+              <a:rPr lang="de-CH" dirty="0" smtClean="0"/>
+              <a:t> </a:t>
+            </a:r>
+            <a:r>
+              <a:rPr lang="de-CH" dirty="0" err="1" smtClean="0"/>
+              <a:t>for</a:t>
+            </a:r>
+            <a:r>
+              <a:rPr lang="de-CH" dirty="0" smtClean="0"/>
+              <a:t> </a:t>
+            </a:r>
+            <a:r>
+              <a:rPr lang="de-CH" dirty="0" err="1" smtClean="0"/>
+              <a:t>the</a:t>
+            </a:r>
+            <a:r>
+              <a:rPr lang="de-CH" dirty="0" smtClean="0"/>
+              <a:t> </a:t>
+            </a:r>
+            <a:r>
+              <a:rPr lang="de-CH" dirty="0" err="1" smtClean="0"/>
+              <a:t>location</a:t>
+            </a:r>
+            <a:endParaRPr lang="de-CH" dirty="0" smtClean="0"/>
+          </a:p>
+          <a:p>
+            <a:endParaRPr lang="de-CH" dirty="0" smtClean="0"/>
+          </a:p>
+        </p:txBody>
+      </p:sp>
+      <p:sp>
+        <p:nvSpPr>
+          <p:cNvPr id="5" name="Titel 1"/>
+          <p:cNvSpPr txBox="1">
+            <a:spLocks/>
+          </p:cNvSpPr>
+          <p:nvPr/>
+        </p:nvSpPr>
+        <p:spPr>
+          <a:xfrm>
+            <a:off x="826008" y="408570"/>
+            <a:ext cx="10515600" cy="542750"/>
           </a:xfrm>
           <a:prstGeom prst="rect">
             <a:avLst/>
           </a:prstGeom>
         </p:spPr>
-      </p:pic>
-      <p:sp>
-        <p:nvSpPr>
-          <p:cNvPr id="2" name="Titel 1"/>
-          <p:cNvSpPr>
-            <a:spLocks noGrp="1"/>
-          </p:cNvSpPr>
-          <p:nvPr>
-            <p:ph type="title"/>
-          </p:nvPr>
-        </p:nvSpPr>
-        <p:spPr>
-          <a:xfrm>
-            <a:off x="826008" y="472964"/>
-            <a:ext cx="10515600" cy="1325563"/>
-          </a:xfrm>
-        </p:spPr>
-        <p:txBody>
-          <a:bodyPr>
-            <a:normAutofit/>
+        <p:txBody>
+          <a:bodyPr vert="horz" lIns="91440" tIns="45720" rIns="91440" bIns="45720" rtlCol="0" anchor="ctr">
+            <a:normAutofit fontScale="90000" lnSpcReduction="10000"/>
           </a:bodyPr>
-          <a:lstStyle/>
-          <a:p>
-            <a:r>
-              <a:rPr lang="de-CH" dirty="0"/>
-              <a:t/>
-            </a:r>
-            <a:br>
-              <a:rPr lang="de-CH" dirty="0"/>
-            </a:br>
+          <a:lstStyle>
+            <a:lvl1pPr algn="l" defTabSz="914400" rtl="0" eaLnBrk="1" latinLnBrk="0" hangingPunct="1">
+              <a:lnSpc>
+                <a:spcPct val="90000"/>
+              </a:lnSpc>
+              <a:spcBef>
+                <a:spcPct val="0"/>
+              </a:spcBef>
+              <a:buNone/>
+              <a:defRPr sz="4400" kern="1200">
+                <a:solidFill>
+                  <a:schemeClr val="tx1"/>
+                </a:solidFill>
+                <a:latin typeface="+mj-lt"/>
+                <a:ea typeface="+mj-ea"/>
+                <a:cs typeface="+mj-cs"/>
+              </a:defRPr>
+            </a:lvl1pPr>
+          </a:lstStyle>
+          <a:p>
             <a:r>
               <a:rPr lang="de-CH" sz="4000" b="1" dirty="0" err="1" smtClean="0"/>
               <a:t>Questions</a:t>
             </a:r>
             <a:endParaRPr lang="de-CH" dirty="0"/>
-          </a:p>
-        </p:txBody>
-      </p:sp>
-      <p:sp>
-        <p:nvSpPr>
-          <p:cNvPr id="3" name="Inhaltsplatzhalter 2"/>
-          <p:cNvSpPr>
-            <a:spLocks noGrp="1"/>
-          </p:cNvSpPr>
-          <p:nvPr>
-            <p:ph idx="1"/>
-          </p:nvPr>
-        </p:nvSpPr>
-        <p:spPr/>
-        <p:txBody>
-          <a:bodyPr/>
-          <a:lstStyle/>
-          <a:p>
-            <a:r>
-              <a:rPr lang="de-CH" dirty="0" err="1" smtClean="0"/>
-              <a:t>What</a:t>
-            </a:r>
-            <a:r>
-              <a:rPr lang="de-CH" dirty="0" smtClean="0"/>
-              <a:t> do </a:t>
-            </a:r>
-            <a:r>
-              <a:rPr lang="de-CH" dirty="0" err="1" smtClean="0"/>
-              <a:t>you</a:t>
-            </a:r>
-            <a:r>
-              <a:rPr lang="de-CH" dirty="0" smtClean="0"/>
-              <a:t> </a:t>
-            </a:r>
-            <a:r>
-              <a:rPr lang="de-CH" dirty="0" err="1" smtClean="0"/>
-              <a:t>need</a:t>
-            </a:r>
-            <a:r>
-              <a:rPr lang="de-CH" dirty="0" smtClean="0"/>
-              <a:t> </a:t>
-            </a:r>
-            <a:r>
-              <a:rPr lang="de-CH" dirty="0" err="1" smtClean="0"/>
-              <a:t>to</a:t>
-            </a:r>
-            <a:r>
-              <a:rPr lang="de-CH" dirty="0" smtClean="0"/>
-              <a:t> </a:t>
-            </a:r>
-            <a:r>
-              <a:rPr lang="de-CH" dirty="0" err="1" smtClean="0"/>
-              <a:t>add</a:t>
-            </a:r>
-            <a:r>
-              <a:rPr lang="de-CH" dirty="0" smtClean="0"/>
-              <a:t> in </a:t>
-            </a:r>
-            <a:r>
-              <a:rPr lang="de-CH" dirty="0" err="1" smtClean="0"/>
-              <a:t>the</a:t>
-            </a:r>
-            <a:r>
-              <a:rPr lang="de-CH" dirty="0" smtClean="0"/>
-              <a:t> relative </a:t>
-            </a:r>
-            <a:r>
-              <a:rPr lang="de-CH" dirty="0" err="1" smtClean="0"/>
-              <a:t>project</a:t>
-            </a:r>
-            <a:r>
-              <a:rPr lang="de-CH" dirty="0" smtClean="0"/>
-              <a:t> </a:t>
-            </a:r>
-            <a:r>
-              <a:rPr lang="de-CH" dirty="0" err="1" smtClean="0"/>
-              <a:t>location</a:t>
-            </a:r>
-            <a:r>
-              <a:rPr lang="de-CH" dirty="0" smtClean="0"/>
-              <a:t> </a:t>
-            </a:r>
-            <a:r>
-              <a:rPr lang="de-CH" dirty="0" err="1" smtClean="0"/>
-              <a:t>to</a:t>
-            </a:r>
-            <a:r>
-              <a:rPr lang="de-CH" dirty="0" smtClean="0"/>
-              <a:t> </a:t>
-            </a:r>
-            <a:r>
-              <a:rPr lang="de-CH" dirty="0" err="1" smtClean="0"/>
-              <a:t>move</a:t>
-            </a:r>
-            <a:r>
-              <a:rPr lang="de-CH" dirty="0" smtClean="0"/>
-              <a:t> </a:t>
-            </a:r>
-            <a:r>
-              <a:rPr lang="de-CH" dirty="0" err="1" smtClean="0"/>
-              <a:t>up</a:t>
-            </a:r>
-            <a:r>
-              <a:rPr lang="de-CH" dirty="0" smtClean="0"/>
-              <a:t> on </a:t>
-            </a:r>
-            <a:r>
-              <a:rPr lang="de-CH" dirty="0" err="1" smtClean="0"/>
-              <a:t>step</a:t>
-            </a:r>
-            <a:r>
-              <a:rPr lang="de-CH" dirty="0" smtClean="0"/>
-              <a:t> in </a:t>
-            </a:r>
-            <a:r>
-              <a:rPr lang="de-CH" dirty="0" err="1" smtClean="0"/>
-              <a:t>the</a:t>
-            </a:r>
-            <a:r>
-              <a:rPr lang="de-CH" dirty="0" smtClean="0"/>
-              <a:t> </a:t>
-            </a:r>
-            <a:r>
-              <a:rPr lang="de-CH" dirty="0" err="1" smtClean="0"/>
-              <a:t>folder</a:t>
-            </a:r>
-            <a:r>
-              <a:rPr lang="de-CH" dirty="0" smtClean="0"/>
-              <a:t> </a:t>
-            </a:r>
-            <a:r>
-              <a:rPr lang="de-CH" dirty="0" err="1" smtClean="0"/>
-              <a:t>directory</a:t>
-            </a:r>
-            <a:r>
-              <a:rPr lang="de-CH" dirty="0" smtClean="0"/>
-              <a:t>?</a:t>
-            </a:r>
-            <a:endParaRPr lang="de-CH" dirty="0" smtClean="0"/>
           </a:p>
         </p:txBody>
       </p:sp>

</xml_diff>

<commit_message>
Alle Übungen vom Donnerstag erledigt und geprüft. Neue Files hinzugefügt, Processor Expert erweitert und Eventhandling eingeführt.
</commit_message>
<xml_diff>
--- a/Recap.pptx
+++ b/Recap.pptx
@@ -3097,10 +3097,10 @@
           </a:p>
           <a:p>
             <a:r>
-              <a:rPr lang="de-CH" sz="4000" b="1" dirty="0" smtClean="0"/>
+              <a:rPr lang="de-CH" sz="3600" b="1" dirty="0" smtClean="0"/>
               <a:t>SW1/Fr</a:t>
             </a:r>
-            <a:endParaRPr lang="de-CH" sz="4000" dirty="0"/>
+            <a:endParaRPr lang="de-CH" sz="3600" dirty="0"/>
           </a:p>
         </p:txBody>
       </p:sp>
@@ -4044,11 +4044,25 @@
               <a:buChar char="§"/>
             </a:pPr>
             <a:r>
-              <a:rPr lang="de-CH" dirty="0"/>
+              <a:rPr lang="de-CH" dirty="0">
+                <a:solidFill>
+                  <a:schemeClr val="tx1">
+                    <a:lumMod val="50000"/>
+                    <a:lumOff val="50000"/>
+                  </a:schemeClr>
+                </a:solidFill>
+              </a:rPr>
               <a:t>${PARENT-1 PROJECT_LOC</a:t>
             </a:r>
             <a:r>
-              <a:rPr lang="de-CH" dirty="0" smtClean="0"/>
+              <a:rPr lang="de-CH" dirty="0" smtClean="0">
+                <a:solidFill>
+                  <a:schemeClr val="tx1">
+                    <a:lumMod val="50000"/>
+                    <a:lumOff val="50000"/>
+                  </a:schemeClr>
+                </a:solidFill>
+              </a:rPr>
               <a:t>}</a:t>
             </a:r>
           </a:p>

</xml_diff>